<commit_message>
Adding arrows to dynamic w(x)
</commit_message>
<xml_diff>
--- a/Figures/Peters figures.pptx
+++ b/Figures/Peters figures.pptx
@@ -9,6 +9,7 @@
     <p:sldId id="257" r:id="rId3"/>
     <p:sldId id="258" r:id="rId4"/>
     <p:sldId id="259" r:id="rId5"/>
+    <p:sldId id="260" r:id="rId6"/>
   </p:sldIdLst>
   <p:sldSz cx="12192000" cy="6858000"/>
   <p:notesSz cx="6858000" cy="9144000"/>
@@ -129,7 +130,7 @@
 <file path=ppt/revisionInfo.xml><?xml version="1.0" encoding="utf-8"?>
 <p1510:revInfo xmlns:a="http://schemas.openxmlformats.org/drawingml/2006/main" xmlns:r="http://schemas.openxmlformats.org/officeDocument/2006/relationships" xmlns:p1510="http://schemas.microsoft.com/office/powerpoint/2015/10/main">
   <p1510:revLst>
-    <p1510:client id="{9DC1881A-025A-4BAE-ADDC-8EAB9C68E346}" v="4" dt="2020-10-26T12:17:45.572"/>
+    <p1510:client id="{9DC1881A-025A-4BAE-ADDC-8EAB9C68E346}" v="26" dt="2020-10-27T08:28:14.138"/>
   </p1510:revLst>
 </p1510:revInfo>
 </file>
@@ -138,8 +139,8 @@
 <pc:chgInfo xmlns:a="http://schemas.openxmlformats.org/drawingml/2006/main" xmlns:r="http://schemas.openxmlformats.org/officeDocument/2006/relationships" xmlns:ac="http://schemas.microsoft.com/office/drawing/2013/main/command" xmlns:pc="http://schemas.microsoft.com/office/powerpoint/2013/main/command">
   <pc:docChgLst>
     <pc:chgData name="benjamin Skjold" userId="c95198f139ad621b" providerId="LiveId" clId="{9DC1881A-025A-4BAE-ADDC-8EAB9C68E346}"/>
-    <pc:docChg chg="modSld">
-      <pc:chgData name="benjamin Skjold" userId="c95198f139ad621b" providerId="LiveId" clId="{9DC1881A-025A-4BAE-ADDC-8EAB9C68E346}" dt="2020-10-26T12:17:45.572" v="3" actId="164"/>
+    <pc:docChg chg="undo custSel addSld modSld">
+      <pc:chgData name="benjamin Skjold" userId="c95198f139ad621b" providerId="LiveId" clId="{9DC1881A-025A-4BAE-ADDC-8EAB9C68E346}" dt="2020-10-27T08:28:14.138" v="792" actId="164"/>
       <pc:docMkLst>
         <pc:docMk/>
       </pc:docMkLst>
@@ -491,6 +492,149 @@
           </ac:cxnSpMkLst>
         </pc:cxnChg>
       </pc:sldChg>
+      <pc:sldChg chg="addSp delSp modSp add">
+        <pc:chgData name="benjamin Skjold" userId="c95198f139ad621b" providerId="LiveId" clId="{9DC1881A-025A-4BAE-ADDC-8EAB9C68E346}" dt="2020-10-27T08:28:14.138" v="792" actId="164"/>
+        <pc:sldMkLst>
+          <pc:docMk/>
+          <pc:sldMk cId="2649588615" sldId="260"/>
+        </pc:sldMkLst>
+        <pc:grpChg chg="add mod">
+          <ac:chgData name="benjamin Skjold" userId="c95198f139ad621b" providerId="LiveId" clId="{9DC1881A-025A-4BAE-ADDC-8EAB9C68E346}" dt="2020-10-27T08:28:14.138" v="792" actId="164"/>
+          <ac:grpSpMkLst>
+            <pc:docMk/>
+            <pc:sldMk cId="2649588615" sldId="260"/>
+            <ac:grpSpMk id="41" creationId="{BDB3E4F6-1480-41BF-994C-713E31DB05F1}"/>
+          </ac:grpSpMkLst>
+        </pc:grpChg>
+        <pc:picChg chg="add mod">
+          <ac:chgData name="benjamin Skjold" userId="c95198f139ad621b" providerId="LiveId" clId="{9DC1881A-025A-4BAE-ADDC-8EAB9C68E346}" dt="2020-10-27T08:28:14.138" v="792" actId="164"/>
+          <ac:picMkLst>
+            <pc:docMk/>
+            <pc:sldMk cId="2649588615" sldId="260"/>
+            <ac:picMk id="3" creationId="{F636FA7D-45F2-4EF9-A099-CD80A022D034}"/>
+          </ac:picMkLst>
+        </pc:picChg>
+        <pc:cxnChg chg="add del mod">
+          <ac:chgData name="benjamin Skjold" userId="c95198f139ad621b" providerId="LiveId" clId="{9DC1881A-025A-4BAE-ADDC-8EAB9C68E346}" dt="2020-10-27T08:22:29.338" v="70" actId="478"/>
+          <ac:cxnSpMkLst>
+            <pc:docMk/>
+            <pc:sldMk cId="2649588615" sldId="260"/>
+            <ac:cxnSpMk id="4" creationId="{5E57E83B-9B70-4458-B90D-B55C136596FA}"/>
+          </ac:cxnSpMkLst>
+        </pc:cxnChg>
+        <pc:cxnChg chg="add mod">
+          <ac:chgData name="benjamin Skjold" userId="c95198f139ad621b" providerId="LiveId" clId="{9DC1881A-025A-4BAE-ADDC-8EAB9C68E346}" dt="2020-10-27T08:28:14.138" v="792" actId="164"/>
+          <ac:cxnSpMkLst>
+            <pc:docMk/>
+            <pc:sldMk cId="2649588615" sldId="260"/>
+            <ac:cxnSpMk id="9" creationId="{57226D2A-1EAD-4CB7-913B-A246BB9D3152}"/>
+          </ac:cxnSpMkLst>
+        </pc:cxnChg>
+        <pc:cxnChg chg="add mod">
+          <ac:chgData name="benjamin Skjold" userId="c95198f139ad621b" providerId="LiveId" clId="{9DC1881A-025A-4BAE-ADDC-8EAB9C68E346}" dt="2020-10-27T08:28:14.138" v="792" actId="164"/>
+          <ac:cxnSpMkLst>
+            <pc:docMk/>
+            <pc:sldMk cId="2649588615" sldId="260"/>
+            <ac:cxnSpMk id="10" creationId="{94F2C5F2-4691-44D1-9BBB-21483E9D6406}"/>
+          </ac:cxnSpMkLst>
+        </pc:cxnChg>
+        <pc:cxnChg chg="add mod">
+          <ac:chgData name="benjamin Skjold" userId="c95198f139ad621b" providerId="LiveId" clId="{9DC1881A-025A-4BAE-ADDC-8EAB9C68E346}" dt="2020-10-27T08:28:14.138" v="792" actId="164"/>
+          <ac:cxnSpMkLst>
+            <pc:docMk/>
+            <pc:sldMk cId="2649588615" sldId="260"/>
+            <ac:cxnSpMk id="11" creationId="{19065882-D7E5-49B9-8161-ED1B127CA681}"/>
+          </ac:cxnSpMkLst>
+        </pc:cxnChg>
+        <pc:cxnChg chg="add mod">
+          <ac:chgData name="benjamin Skjold" userId="c95198f139ad621b" providerId="LiveId" clId="{9DC1881A-025A-4BAE-ADDC-8EAB9C68E346}" dt="2020-10-27T08:28:14.138" v="792" actId="164"/>
+          <ac:cxnSpMkLst>
+            <pc:docMk/>
+            <pc:sldMk cId="2649588615" sldId="260"/>
+            <ac:cxnSpMk id="12" creationId="{AA94B128-256C-4496-AEC9-7B24D2F1BE44}"/>
+          </ac:cxnSpMkLst>
+        </pc:cxnChg>
+        <pc:cxnChg chg="add mod">
+          <ac:chgData name="benjamin Skjold" userId="c95198f139ad621b" providerId="LiveId" clId="{9DC1881A-025A-4BAE-ADDC-8EAB9C68E346}" dt="2020-10-27T08:28:14.138" v="792" actId="164"/>
+          <ac:cxnSpMkLst>
+            <pc:docMk/>
+            <pc:sldMk cId="2649588615" sldId="260"/>
+            <ac:cxnSpMk id="13" creationId="{23A2A2BD-765B-47BF-813A-A5F1ACE0E8CF}"/>
+          </ac:cxnSpMkLst>
+        </pc:cxnChg>
+        <pc:cxnChg chg="add mod">
+          <ac:chgData name="benjamin Skjold" userId="c95198f139ad621b" providerId="LiveId" clId="{9DC1881A-025A-4BAE-ADDC-8EAB9C68E346}" dt="2020-10-27T08:28:14.138" v="792" actId="164"/>
+          <ac:cxnSpMkLst>
+            <pc:docMk/>
+            <pc:sldMk cId="2649588615" sldId="260"/>
+            <ac:cxnSpMk id="14" creationId="{E4BC0C90-ADE5-453E-A5D1-32121A0C24E6}"/>
+          </ac:cxnSpMkLst>
+        </pc:cxnChg>
+        <pc:cxnChg chg="add mod">
+          <ac:chgData name="benjamin Skjold" userId="c95198f139ad621b" providerId="LiveId" clId="{9DC1881A-025A-4BAE-ADDC-8EAB9C68E346}" dt="2020-10-27T08:28:14.138" v="792" actId="164"/>
+          <ac:cxnSpMkLst>
+            <pc:docMk/>
+            <pc:sldMk cId="2649588615" sldId="260"/>
+            <ac:cxnSpMk id="15" creationId="{D5DEA551-0E58-4C03-AA50-4BFFA19E3BFE}"/>
+          </ac:cxnSpMkLst>
+        </pc:cxnChg>
+        <pc:cxnChg chg="add mod">
+          <ac:chgData name="benjamin Skjold" userId="c95198f139ad621b" providerId="LiveId" clId="{9DC1881A-025A-4BAE-ADDC-8EAB9C68E346}" dt="2020-10-27T08:28:14.138" v="792" actId="164"/>
+          <ac:cxnSpMkLst>
+            <pc:docMk/>
+            <pc:sldMk cId="2649588615" sldId="260"/>
+            <ac:cxnSpMk id="16" creationId="{EF7C5847-8D04-45B8-80AC-CE8EF2422870}"/>
+          </ac:cxnSpMkLst>
+        </pc:cxnChg>
+        <pc:cxnChg chg="add mod">
+          <ac:chgData name="benjamin Skjold" userId="c95198f139ad621b" providerId="LiveId" clId="{9DC1881A-025A-4BAE-ADDC-8EAB9C68E346}" dt="2020-10-27T08:28:14.138" v="792" actId="164"/>
+          <ac:cxnSpMkLst>
+            <pc:docMk/>
+            <pc:sldMk cId="2649588615" sldId="260"/>
+            <ac:cxnSpMk id="28" creationId="{581A61FA-5C45-4806-A911-EE7CC02A6F6F}"/>
+          </ac:cxnSpMkLst>
+        </pc:cxnChg>
+        <pc:cxnChg chg="add mod">
+          <ac:chgData name="benjamin Skjold" userId="c95198f139ad621b" providerId="LiveId" clId="{9DC1881A-025A-4BAE-ADDC-8EAB9C68E346}" dt="2020-10-27T08:28:14.138" v="792" actId="164"/>
+          <ac:cxnSpMkLst>
+            <pc:docMk/>
+            <pc:sldMk cId="2649588615" sldId="260"/>
+            <ac:cxnSpMk id="30" creationId="{5ABA4E5E-406E-42D5-9ADE-F63CEBA767ED}"/>
+          </ac:cxnSpMkLst>
+        </pc:cxnChg>
+        <pc:cxnChg chg="add mod">
+          <ac:chgData name="benjamin Skjold" userId="c95198f139ad621b" providerId="LiveId" clId="{9DC1881A-025A-4BAE-ADDC-8EAB9C68E346}" dt="2020-10-27T08:28:14.138" v="792" actId="164"/>
+          <ac:cxnSpMkLst>
+            <pc:docMk/>
+            <pc:sldMk cId="2649588615" sldId="260"/>
+            <ac:cxnSpMk id="32" creationId="{E2117E4C-1031-470F-9328-94513A09B7E1}"/>
+          </ac:cxnSpMkLst>
+        </pc:cxnChg>
+        <pc:cxnChg chg="add mod">
+          <ac:chgData name="benjamin Skjold" userId="c95198f139ad621b" providerId="LiveId" clId="{9DC1881A-025A-4BAE-ADDC-8EAB9C68E346}" dt="2020-10-27T08:28:14.138" v="792" actId="164"/>
+          <ac:cxnSpMkLst>
+            <pc:docMk/>
+            <pc:sldMk cId="2649588615" sldId="260"/>
+            <ac:cxnSpMk id="35" creationId="{A838D75F-BB40-4838-8FD9-64C1395AF25D}"/>
+          </ac:cxnSpMkLst>
+        </pc:cxnChg>
+        <pc:cxnChg chg="add mod">
+          <ac:chgData name="benjamin Skjold" userId="c95198f139ad621b" providerId="LiveId" clId="{9DC1881A-025A-4BAE-ADDC-8EAB9C68E346}" dt="2020-10-27T08:28:14.138" v="792" actId="164"/>
+          <ac:cxnSpMkLst>
+            <pc:docMk/>
+            <pc:sldMk cId="2649588615" sldId="260"/>
+            <ac:cxnSpMk id="37" creationId="{F863D326-F776-434E-B53B-6BE3AA846F88}"/>
+          </ac:cxnSpMkLst>
+        </pc:cxnChg>
+        <pc:cxnChg chg="add mod">
+          <ac:chgData name="benjamin Skjold" userId="c95198f139ad621b" providerId="LiveId" clId="{9DC1881A-025A-4BAE-ADDC-8EAB9C68E346}" dt="2020-10-27T08:28:14.138" v="792" actId="164"/>
+          <ac:cxnSpMkLst>
+            <pc:docMk/>
+            <pc:sldMk cId="2649588615" sldId="260"/>
+            <ac:cxnSpMk id="39" creationId="{1455B1E8-85F4-4596-BA7F-C5DC6E32F920}"/>
+          </ac:cxnSpMkLst>
+        </pc:cxnChg>
+      </pc:sldChg>
     </pc:docChg>
   </pc:docChgLst>
 </pc:chgInfo>
@@ -645,7 +789,7 @@
           <a:p>
             <a:fld id="{C110FD83-76B9-489D-834C-01C48BAA3849}" type="datetimeFigureOut">
               <a:rPr lang="en-US" smtClean="0"/>
-              <a:t>10/26/2020</a:t>
+              <a:t>10/27/2020</a:t>
             </a:fld>
             <a:endParaRPr lang="en-US"/>
           </a:p>
@@ -845,7 +989,7 @@
           <a:p>
             <a:fld id="{C110FD83-76B9-489D-834C-01C48BAA3849}" type="datetimeFigureOut">
               <a:rPr lang="en-US" smtClean="0"/>
-              <a:t>10/26/2020</a:t>
+              <a:t>10/27/2020</a:t>
             </a:fld>
             <a:endParaRPr lang="en-US"/>
           </a:p>
@@ -1055,7 +1199,7 @@
           <a:p>
             <a:fld id="{C110FD83-76B9-489D-834C-01C48BAA3849}" type="datetimeFigureOut">
               <a:rPr lang="en-US" smtClean="0"/>
-              <a:t>10/26/2020</a:t>
+              <a:t>10/27/2020</a:t>
             </a:fld>
             <a:endParaRPr lang="en-US"/>
           </a:p>
@@ -1255,7 +1399,7 @@
           <a:p>
             <a:fld id="{C110FD83-76B9-489D-834C-01C48BAA3849}" type="datetimeFigureOut">
               <a:rPr lang="en-US" smtClean="0"/>
-              <a:t>10/26/2020</a:t>
+              <a:t>10/27/2020</a:t>
             </a:fld>
             <a:endParaRPr lang="en-US"/>
           </a:p>
@@ -1531,7 +1675,7 @@
           <a:p>
             <a:fld id="{C110FD83-76B9-489D-834C-01C48BAA3849}" type="datetimeFigureOut">
               <a:rPr lang="en-US" smtClean="0"/>
-              <a:t>10/26/2020</a:t>
+              <a:t>10/27/2020</a:t>
             </a:fld>
             <a:endParaRPr lang="en-US"/>
           </a:p>
@@ -1799,7 +1943,7 @@
           <a:p>
             <a:fld id="{C110FD83-76B9-489D-834C-01C48BAA3849}" type="datetimeFigureOut">
               <a:rPr lang="en-US" smtClean="0"/>
-              <a:t>10/26/2020</a:t>
+              <a:t>10/27/2020</a:t>
             </a:fld>
             <a:endParaRPr lang="en-US"/>
           </a:p>
@@ -2214,7 +2358,7 @@
           <a:p>
             <a:fld id="{C110FD83-76B9-489D-834C-01C48BAA3849}" type="datetimeFigureOut">
               <a:rPr lang="en-US" smtClean="0"/>
-              <a:t>10/26/2020</a:t>
+              <a:t>10/27/2020</a:t>
             </a:fld>
             <a:endParaRPr lang="en-US"/>
           </a:p>
@@ -2356,7 +2500,7 @@
           <a:p>
             <a:fld id="{C110FD83-76B9-489D-834C-01C48BAA3849}" type="datetimeFigureOut">
               <a:rPr lang="en-US" smtClean="0"/>
-              <a:t>10/26/2020</a:t>
+              <a:t>10/27/2020</a:t>
             </a:fld>
             <a:endParaRPr lang="en-US"/>
           </a:p>
@@ -2469,7 +2613,7 @@
           <a:p>
             <a:fld id="{C110FD83-76B9-489D-834C-01C48BAA3849}" type="datetimeFigureOut">
               <a:rPr lang="en-US" smtClean="0"/>
-              <a:t>10/26/2020</a:t>
+              <a:t>10/27/2020</a:t>
             </a:fld>
             <a:endParaRPr lang="en-US"/>
           </a:p>
@@ -2782,7 +2926,7 @@
           <a:p>
             <a:fld id="{C110FD83-76B9-489D-834C-01C48BAA3849}" type="datetimeFigureOut">
               <a:rPr lang="en-US" smtClean="0"/>
-              <a:t>10/26/2020</a:t>
+              <a:t>10/27/2020</a:t>
             </a:fld>
             <a:endParaRPr lang="en-US"/>
           </a:p>
@@ -3071,7 +3215,7 @@
           <a:p>
             <a:fld id="{C110FD83-76B9-489D-834C-01C48BAA3849}" type="datetimeFigureOut">
               <a:rPr lang="en-US" smtClean="0"/>
-              <a:t>10/26/2020</a:t>
+              <a:t>10/27/2020</a:t>
             </a:fld>
             <a:endParaRPr lang="en-US"/>
           </a:p>
@@ -3314,7 +3458,7 @@
           <a:p>
             <a:fld id="{C110FD83-76B9-489D-834C-01C48BAA3849}" type="datetimeFigureOut">
               <a:rPr lang="en-US" smtClean="0"/>
-              <a:t>10/26/2020</a:t>
+              <a:t>10/27/2020</a:t>
             </a:fld>
             <a:endParaRPr lang="en-US"/>
           </a:p>
@@ -5486,6 +5630,723 @@
 </p:sld>
 </file>
 
+<file path=ppt/slides/slide5.xml><?xml version="1.0" encoding="utf-8"?>
+<p:sld xmlns:a="http://schemas.openxmlformats.org/drawingml/2006/main" xmlns:r="http://schemas.openxmlformats.org/officeDocument/2006/relationships" xmlns:p="http://schemas.openxmlformats.org/presentationml/2006/main">
+  <p:cSld>
+    <p:spTree>
+      <p:nvGrpSpPr>
+        <p:cNvPr id="1" name=""/>
+        <p:cNvGrpSpPr/>
+        <p:nvPr/>
+      </p:nvGrpSpPr>
+      <p:grpSpPr>
+        <a:xfrm>
+          <a:off x="0" y="0"/>
+          <a:ext cx="0" cy="0"/>
+          <a:chOff x="0" y="0"/>
+          <a:chExt cx="0" cy="0"/>
+        </a:xfrm>
+      </p:grpSpPr>
+      <p:grpSp>
+        <p:nvGrpSpPr>
+          <p:cNvPr id="41" name="Gruppe 40">
+            <a:extLst>
+              <a:ext uri="{FF2B5EF4-FFF2-40B4-BE49-F238E27FC236}">
+                <a16:creationId xmlns:a16="http://schemas.microsoft.com/office/drawing/2014/main" id="{BDB3E4F6-1480-41BF-994C-713E31DB05F1}"/>
+              </a:ext>
+            </a:extLst>
+          </p:cNvPr>
+          <p:cNvGrpSpPr/>
+          <p:nvPr/>
+        </p:nvGrpSpPr>
+        <p:grpSpPr>
+          <a:xfrm>
+            <a:off x="3033160" y="1243579"/>
+            <a:ext cx="5852172" cy="4370841"/>
+            <a:chOff x="3033160" y="1243579"/>
+            <a:chExt cx="5852172" cy="4370841"/>
+          </a:xfrm>
+        </p:grpSpPr>
+        <p:pic>
+          <p:nvPicPr>
+            <p:cNvPr id="3" name="Billede 2">
+              <a:extLst>
+                <a:ext uri="{FF2B5EF4-FFF2-40B4-BE49-F238E27FC236}">
+                  <a16:creationId xmlns:a16="http://schemas.microsoft.com/office/drawing/2014/main" id="{F636FA7D-45F2-4EF9-A099-CD80A022D034}"/>
+                </a:ext>
+              </a:extLst>
+            </p:cNvPr>
+            <p:cNvPicPr>
+              <a:picLocks noChangeAspect="1"/>
+            </p:cNvPicPr>
+            <p:nvPr/>
+          </p:nvPicPr>
+          <p:blipFill>
+            <a:blip r:embed="rId2">
+              <a:extLst>
+                <a:ext uri="{28A0092B-C50C-407E-A947-70E740481C1C}">
+                  <a14:useLocalDpi xmlns:a14="http://schemas.microsoft.com/office/drawing/2010/main" val="0"/>
+                </a:ext>
+              </a:extLst>
+            </a:blip>
+            <a:stretch>
+              <a:fillRect/>
+            </a:stretch>
+          </p:blipFill>
+          <p:spPr>
+            <a:xfrm>
+              <a:off x="3033160" y="1243579"/>
+              <a:ext cx="5852172" cy="4370841"/>
+            </a:xfrm>
+            <a:prstGeom prst="rect">
+              <a:avLst/>
+            </a:prstGeom>
+          </p:spPr>
+        </p:pic>
+        <p:cxnSp>
+          <p:nvCxnSpPr>
+            <p:cNvPr id="9" name="Lige pilforbindelse 8">
+              <a:extLst>
+                <a:ext uri="{FF2B5EF4-FFF2-40B4-BE49-F238E27FC236}">
+                  <a16:creationId xmlns:a16="http://schemas.microsoft.com/office/drawing/2014/main" id="{57226D2A-1EAD-4CB7-913B-A246BB9D3152}"/>
+                </a:ext>
+              </a:extLst>
+            </p:cNvPr>
+            <p:cNvCxnSpPr>
+              <a:cxnSpLocks/>
+            </p:cNvCxnSpPr>
+            <p:nvPr/>
+          </p:nvCxnSpPr>
+          <p:spPr>
+            <a:xfrm>
+              <a:off x="7948613" y="2375095"/>
+              <a:ext cx="132337" cy="0"/>
+            </a:xfrm>
+            <a:prstGeom prst="straightConnector1">
+              <a:avLst/>
+            </a:prstGeom>
+            <a:ln w="25400" cap="rnd">
+              <a:solidFill>
+                <a:schemeClr val="tx1"/>
+              </a:solidFill>
+              <a:headEnd type="triangle"/>
+              <a:tailEnd type="none"/>
+            </a:ln>
+          </p:spPr>
+          <p:style>
+            <a:lnRef idx="1">
+              <a:schemeClr val="accent1"/>
+            </a:lnRef>
+            <a:fillRef idx="0">
+              <a:schemeClr val="accent1"/>
+            </a:fillRef>
+            <a:effectRef idx="0">
+              <a:schemeClr val="accent1"/>
+            </a:effectRef>
+            <a:fontRef idx="minor">
+              <a:schemeClr val="tx1"/>
+            </a:fontRef>
+          </p:style>
+        </p:cxnSp>
+        <p:cxnSp>
+          <p:nvCxnSpPr>
+            <p:cNvPr id="10" name="Lige pilforbindelse 9">
+              <a:extLst>
+                <a:ext uri="{FF2B5EF4-FFF2-40B4-BE49-F238E27FC236}">
+                  <a16:creationId xmlns:a16="http://schemas.microsoft.com/office/drawing/2014/main" id="{94F2C5F2-4691-44D1-9BBB-21483E9D6406}"/>
+                </a:ext>
+              </a:extLst>
+            </p:cNvPr>
+            <p:cNvCxnSpPr>
+              <a:cxnSpLocks/>
+            </p:cNvCxnSpPr>
+            <p:nvPr/>
+          </p:nvCxnSpPr>
+          <p:spPr>
+            <a:xfrm>
+              <a:off x="7693819" y="2705943"/>
+              <a:ext cx="383139" cy="0"/>
+            </a:xfrm>
+            <a:prstGeom prst="straightConnector1">
+              <a:avLst/>
+            </a:prstGeom>
+            <a:ln w="25400" cap="rnd">
+              <a:solidFill>
+                <a:schemeClr val="tx1"/>
+              </a:solidFill>
+              <a:headEnd type="triangle"/>
+              <a:tailEnd type="none"/>
+            </a:ln>
+          </p:spPr>
+          <p:style>
+            <a:lnRef idx="1">
+              <a:schemeClr val="accent1"/>
+            </a:lnRef>
+            <a:fillRef idx="0">
+              <a:schemeClr val="accent1"/>
+            </a:fillRef>
+            <a:effectRef idx="0">
+              <a:schemeClr val="accent1"/>
+            </a:effectRef>
+            <a:fontRef idx="minor">
+              <a:schemeClr val="tx1"/>
+            </a:fontRef>
+          </p:style>
+        </p:cxnSp>
+        <p:cxnSp>
+          <p:nvCxnSpPr>
+            <p:cNvPr id="11" name="Lige pilforbindelse 10">
+              <a:extLst>
+                <a:ext uri="{FF2B5EF4-FFF2-40B4-BE49-F238E27FC236}">
+                  <a16:creationId xmlns:a16="http://schemas.microsoft.com/office/drawing/2014/main" id="{19065882-D7E5-49B9-8161-ED1B127CA681}"/>
+                </a:ext>
+              </a:extLst>
+            </p:cNvPr>
+            <p:cNvCxnSpPr>
+              <a:cxnSpLocks/>
+            </p:cNvCxnSpPr>
+            <p:nvPr/>
+          </p:nvCxnSpPr>
+          <p:spPr>
+            <a:xfrm>
+              <a:off x="7260431" y="3036791"/>
+              <a:ext cx="717000" cy="0"/>
+            </a:xfrm>
+            <a:prstGeom prst="straightConnector1">
+              <a:avLst/>
+            </a:prstGeom>
+            <a:ln w="25400" cap="rnd">
+              <a:solidFill>
+                <a:schemeClr val="tx1"/>
+              </a:solidFill>
+              <a:headEnd type="triangle"/>
+              <a:tailEnd type="none"/>
+            </a:ln>
+          </p:spPr>
+          <p:style>
+            <a:lnRef idx="1">
+              <a:schemeClr val="accent1"/>
+            </a:lnRef>
+            <a:fillRef idx="0">
+              <a:schemeClr val="accent1"/>
+            </a:fillRef>
+            <a:effectRef idx="0">
+              <a:schemeClr val="accent1"/>
+            </a:effectRef>
+            <a:fontRef idx="minor">
+              <a:schemeClr val="tx1"/>
+            </a:fontRef>
+          </p:style>
+        </p:cxnSp>
+        <p:cxnSp>
+          <p:nvCxnSpPr>
+            <p:cNvPr id="12" name="Lige pilforbindelse 11">
+              <a:extLst>
+                <a:ext uri="{FF2B5EF4-FFF2-40B4-BE49-F238E27FC236}">
+                  <a16:creationId xmlns:a16="http://schemas.microsoft.com/office/drawing/2014/main" id="{AA94B128-256C-4496-AEC9-7B24D2F1BE44}"/>
+                </a:ext>
+              </a:extLst>
+            </p:cNvPr>
+            <p:cNvCxnSpPr>
+              <a:cxnSpLocks/>
+            </p:cNvCxnSpPr>
+            <p:nvPr/>
+          </p:nvCxnSpPr>
+          <p:spPr>
+            <a:xfrm>
+              <a:off x="6655831" y="3367639"/>
+              <a:ext cx="680893" cy="0"/>
+            </a:xfrm>
+            <a:prstGeom prst="straightConnector1">
+              <a:avLst/>
+            </a:prstGeom>
+            <a:ln w="25400" cap="rnd">
+              <a:solidFill>
+                <a:schemeClr val="tx1"/>
+              </a:solidFill>
+              <a:headEnd type="triangle"/>
+              <a:tailEnd type="none"/>
+            </a:ln>
+          </p:spPr>
+          <p:style>
+            <a:lnRef idx="1">
+              <a:schemeClr val="accent1"/>
+            </a:lnRef>
+            <a:fillRef idx="0">
+              <a:schemeClr val="accent1"/>
+            </a:fillRef>
+            <a:effectRef idx="0">
+              <a:schemeClr val="accent1"/>
+            </a:effectRef>
+            <a:fontRef idx="minor">
+              <a:schemeClr val="tx1"/>
+            </a:fontRef>
+          </p:style>
+        </p:cxnSp>
+        <p:cxnSp>
+          <p:nvCxnSpPr>
+            <p:cNvPr id="13" name="Lige pilforbindelse 12">
+              <a:extLst>
+                <a:ext uri="{FF2B5EF4-FFF2-40B4-BE49-F238E27FC236}">
+                  <a16:creationId xmlns:a16="http://schemas.microsoft.com/office/drawing/2014/main" id="{23A2A2BD-765B-47BF-813A-A5F1ACE0E8CF}"/>
+                </a:ext>
+              </a:extLst>
+            </p:cNvPr>
+            <p:cNvCxnSpPr>
+              <a:cxnSpLocks/>
+            </p:cNvCxnSpPr>
+            <p:nvPr/>
+          </p:nvCxnSpPr>
+          <p:spPr>
+            <a:xfrm>
+              <a:off x="4841847" y="3837622"/>
+              <a:ext cx="558828" cy="24766"/>
+            </a:xfrm>
+            <a:prstGeom prst="straightConnector1">
+              <a:avLst/>
+            </a:prstGeom>
+            <a:ln w="25400" cap="rnd">
+              <a:solidFill>
+                <a:schemeClr val="tx1"/>
+              </a:solidFill>
+              <a:headEnd type="none"/>
+              <a:tailEnd type="triangle"/>
+            </a:ln>
+          </p:spPr>
+          <p:style>
+            <a:lnRef idx="1">
+              <a:schemeClr val="accent1"/>
+            </a:lnRef>
+            <a:fillRef idx="0">
+              <a:schemeClr val="accent1"/>
+            </a:fillRef>
+            <a:effectRef idx="0">
+              <a:schemeClr val="accent1"/>
+            </a:effectRef>
+            <a:fontRef idx="minor">
+              <a:schemeClr val="tx1"/>
+            </a:fontRef>
+          </p:style>
+        </p:cxnSp>
+        <p:cxnSp>
+          <p:nvCxnSpPr>
+            <p:cNvPr id="14" name="Lige pilforbindelse 13">
+              <a:extLst>
+                <a:ext uri="{FF2B5EF4-FFF2-40B4-BE49-F238E27FC236}">
+                  <a16:creationId xmlns:a16="http://schemas.microsoft.com/office/drawing/2014/main" id="{E4BC0C90-ADE5-453E-A5D1-32121A0C24E6}"/>
+                </a:ext>
+              </a:extLst>
+            </p:cNvPr>
+            <p:cNvCxnSpPr>
+              <a:cxnSpLocks/>
+            </p:cNvCxnSpPr>
+            <p:nvPr/>
+          </p:nvCxnSpPr>
+          <p:spPr>
+            <a:xfrm>
+              <a:off x="4075484" y="4140984"/>
+              <a:ext cx="766363" cy="0"/>
+            </a:xfrm>
+            <a:prstGeom prst="straightConnector1">
+              <a:avLst/>
+            </a:prstGeom>
+            <a:ln w="25400" cap="rnd">
+              <a:solidFill>
+                <a:schemeClr val="tx1"/>
+              </a:solidFill>
+              <a:headEnd type="none"/>
+              <a:tailEnd type="triangle"/>
+            </a:ln>
+          </p:spPr>
+          <p:style>
+            <a:lnRef idx="1">
+              <a:schemeClr val="accent1"/>
+            </a:lnRef>
+            <a:fillRef idx="0">
+              <a:schemeClr val="accent1"/>
+            </a:fillRef>
+            <a:effectRef idx="0">
+              <a:schemeClr val="accent1"/>
+            </a:effectRef>
+            <a:fontRef idx="minor">
+              <a:schemeClr val="tx1"/>
+            </a:fontRef>
+          </p:style>
+        </p:cxnSp>
+        <p:cxnSp>
+          <p:nvCxnSpPr>
+            <p:cNvPr id="15" name="Lige pilforbindelse 14">
+              <a:extLst>
+                <a:ext uri="{FF2B5EF4-FFF2-40B4-BE49-F238E27FC236}">
+                  <a16:creationId xmlns:a16="http://schemas.microsoft.com/office/drawing/2014/main" id="{D5DEA551-0E58-4C03-AA50-4BFFA19E3BFE}"/>
+                </a:ext>
+              </a:extLst>
+            </p:cNvPr>
+            <p:cNvCxnSpPr>
+              <a:cxnSpLocks/>
+            </p:cNvCxnSpPr>
+            <p:nvPr/>
+          </p:nvCxnSpPr>
+          <p:spPr>
+            <a:xfrm>
+              <a:off x="3992049" y="4419580"/>
+              <a:ext cx="396595" cy="0"/>
+            </a:xfrm>
+            <a:prstGeom prst="straightConnector1">
+              <a:avLst/>
+            </a:prstGeom>
+            <a:ln w="25400" cap="rnd">
+              <a:solidFill>
+                <a:schemeClr val="tx1"/>
+              </a:solidFill>
+              <a:headEnd type="none"/>
+              <a:tailEnd type="triangle"/>
+            </a:ln>
+          </p:spPr>
+          <p:style>
+            <a:lnRef idx="1">
+              <a:schemeClr val="accent1"/>
+            </a:lnRef>
+            <a:fillRef idx="0">
+              <a:schemeClr val="accent1"/>
+            </a:fillRef>
+            <a:effectRef idx="0">
+              <a:schemeClr val="accent1"/>
+            </a:effectRef>
+            <a:fontRef idx="minor">
+              <a:schemeClr val="tx1"/>
+            </a:fontRef>
+          </p:style>
+        </p:cxnSp>
+        <p:cxnSp>
+          <p:nvCxnSpPr>
+            <p:cNvPr id="16" name="Lige pilforbindelse 15">
+              <a:extLst>
+                <a:ext uri="{FF2B5EF4-FFF2-40B4-BE49-F238E27FC236}">
+                  <a16:creationId xmlns:a16="http://schemas.microsoft.com/office/drawing/2014/main" id="{EF7C5847-8D04-45B8-80AC-CE8EF2422870}"/>
+                </a:ext>
+              </a:extLst>
+            </p:cNvPr>
+            <p:cNvCxnSpPr>
+              <a:cxnSpLocks/>
+            </p:cNvCxnSpPr>
+            <p:nvPr/>
+          </p:nvCxnSpPr>
+          <p:spPr>
+            <a:xfrm>
+              <a:off x="3989668" y="4698175"/>
+              <a:ext cx="96557" cy="0"/>
+            </a:xfrm>
+            <a:prstGeom prst="straightConnector1">
+              <a:avLst/>
+            </a:prstGeom>
+            <a:ln w="25400" cap="rnd">
+              <a:solidFill>
+                <a:schemeClr val="tx1"/>
+              </a:solidFill>
+              <a:headEnd type="none"/>
+              <a:tailEnd type="triangle"/>
+            </a:ln>
+          </p:spPr>
+          <p:style>
+            <a:lnRef idx="1">
+              <a:schemeClr val="accent1"/>
+            </a:lnRef>
+            <a:fillRef idx="0">
+              <a:schemeClr val="accent1"/>
+            </a:fillRef>
+            <a:effectRef idx="0">
+              <a:schemeClr val="accent1"/>
+            </a:effectRef>
+            <a:fontRef idx="minor">
+              <a:schemeClr val="tx1"/>
+            </a:fontRef>
+          </p:style>
+        </p:cxnSp>
+        <p:cxnSp>
+          <p:nvCxnSpPr>
+            <p:cNvPr id="28" name="Lige pilforbindelse 27">
+              <a:extLst>
+                <a:ext uri="{FF2B5EF4-FFF2-40B4-BE49-F238E27FC236}">
+                  <a16:creationId xmlns:a16="http://schemas.microsoft.com/office/drawing/2014/main" id="{581A61FA-5C45-4806-A911-EE7CC02A6F6F}"/>
+                </a:ext>
+              </a:extLst>
+            </p:cNvPr>
+            <p:cNvCxnSpPr>
+              <a:cxnSpLocks/>
+            </p:cNvCxnSpPr>
+            <p:nvPr/>
+          </p:nvCxnSpPr>
+          <p:spPr>
+            <a:xfrm>
+              <a:off x="4190346" y="4617213"/>
+              <a:ext cx="241160" cy="0"/>
+            </a:xfrm>
+            <a:prstGeom prst="straightConnector1">
+              <a:avLst/>
+            </a:prstGeom>
+            <a:ln w="25400" cap="rnd">
+              <a:solidFill>
+                <a:schemeClr val="tx1"/>
+              </a:solidFill>
+              <a:headEnd type="none"/>
+              <a:tailEnd type="triangle"/>
+            </a:ln>
+          </p:spPr>
+          <p:style>
+            <a:lnRef idx="1">
+              <a:schemeClr val="accent1"/>
+            </a:lnRef>
+            <a:fillRef idx="0">
+              <a:schemeClr val="accent1"/>
+            </a:fillRef>
+            <a:effectRef idx="0">
+              <a:schemeClr val="accent1"/>
+            </a:effectRef>
+            <a:fontRef idx="minor">
+              <a:schemeClr val="tx1"/>
+            </a:fontRef>
+          </p:style>
+        </p:cxnSp>
+        <p:cxnSp>
+          <p:nvCxnSpPr>
+            <p:cNvPr id="30" name="Lige pilforbindelse 29">
+              <a:extLst>
+                <a:ext uri="{FF2B5EF4-FFF2-40B4-BE49-F238E27FC236}">
+                  <a16:creationId xmlns:a16="http://schemas.microsoft.com/office/drawing/2014/main" id="{5ABA4E5E-406E-42D5-9ADE-F63CEBA767ED}"/>
+                </a:ext>
+              </a:extLst>
+            </p:cNvPr>
+            <p:cNvCxnSpPr>
+              <a:cxnSpLocks/>
+            </p:cNvCxnSpPr>
+            <p:nvPr/>
+          </p:nvCxnSpPr>
+          <p:spPr>
+            <a:xfrm>
+              <a:off x="4551642" y="4341400"/>
+              <a:ext cx="247342" cy="0"/>
+            </a:xfrm>
+            <a:prstGeom prst="straightConnector1">
+              <a:avLst/>
+            </a:prstGeom>
+            <a:ln w="25400" cap="rnd">
+              <a:solidFill>
+                <a:schemeClr val="tx1"/>
+              </a:solidFill>
+              <a:headEnd type="none"/>
+              <a:tailEnd type="triangle"/>
+            </a:ln>
+          </p:spPr>
+          <p:style>
+            <a:lnRef idx="1">
+              <a:schemeClr val="accent1"/>
+            </a:lnRef>
+            <a:fillRef idx="0">
+              <a:schemeClr val="accent1"/>
+            </a:fillRef>
+            <a:effectRef idx="0">
+              <a:schemeClr val="accent1"/>
+            </a:effectRef>
+            <a:fontRef idx="minor">
+              <a:schemeClr val="tx1"/>
+            </a:fontRef>
+          </p:style>
+        </p:cxnSp>
+        <p:cxnSp>
+          <p:nvCxnSpPr>
+            <p:cNvPr id="32" name="Lige pilforbindelse 31">
+              <a:extLst>
+                <a:ext uri="{FF2B5EF4-FFF2-40B4-BE49-F238E27FC236}">
+                  <a16:creationId xmlns:a16="http://schemas.microsoft.com/office/drawing/2014/main" id="{E2117E4C-1031-470F-9328-94513A09B7E1}"/>
+                </a:ext>
+              </a:extLst>
+            </p:cNvPr>
+            <p:cNvCxnSpPr>
+              <a:cxnSpLocks/>
+            </p:cNvCxnSpPr>
+            <p:nvPr/>
+          </p:nvCxnSpPr>
+          <p:spPr>
+            <a:xfrm>
+              <a:off x="5097198" y="4058445"/>
+              <a:ext cx="93927" cy="0"/>
+            </a:xfrm>
+            <a:prstGeom prst="straightConnector1">
+              <a:avLst/>
+            </a:prstGeom>
+            <a:ln w="25400" cap="rnd">
+              <a:solidFill>
+                <a:schemeClr val="tx1"/>
+              </a:solidFill>
+              <a:headEnd type="none"/>
+              <a:tailEnd type="triangle"/>
+            </a:ln>
+          </p:spPr>
+          <p:style>
+            <a:lnRef idx="1">
+              <a:schemeClr val="accent1"/>
+            </a:lnRef>
+            <a:fillRef idx="0">
+              <a:schemeClr val="accent1"/>
+            </a:fillRef>
+            <a:effectRef idx="0">
+              <a:schemeClr val="accent1"/>
+            </a:effectRef>
+            <a:fontRef idx="minor">
+              <a:schemeClr val="tx1"/>
+            </a:fontRef>
+          </p:style>
+        </p:cxnSp>
+        <p:cxnSp>
+          <p:nvCxnSpPr>
+            <p:cNvPr id="35" name="Lige pilforbindelse 34">
+              <a:extLst>
+                <a:ext uri="{FF2B5EF4-FFF2-40B4-BE49-F238E27FC236}">
+                  <a16:creationId xmlns:a16="http://schemas.microsoft.com/office/drawing/2014/main" id="{A838D75F-BB40-4838-8FD9-64C1395AF25D}"/>
+                </a:ext>
+              </a:extLst>
+            </p:cNvPr>
+            <p:cNvCxnSpPr>
+              <a:cxnSpLocks/>
+            </p:cNvCxnSpPr>
+            <p:nvPr/>
+          </p:nvCxnSpPr>
+          <p:spPr>
+            <a:xfrm>
+              <a:off x="7336724" y="2494158"/>
+              <a:ext cx="489432" cy="0"/>
+            </a:xfrm>
+            <a:prstGeom prst="straightConnector1">
+              <a:avLst/>
+            </a:prstGeom>
+            <a:ln w="25400" cap="rnd">
+              <a:solidFill>
+                <a:schemeClr val="tx1"/>
+              </a:solidFill>
+              <a:headEnd type="triangle"/>
+              <a:tailEnd type="none"/>
+            </a:ln>
+          </p:spPr>
+          <p:style>
+            <a:lnRef idx="1">
+              <a:schemeClr val="accent1"/>
+            </a:lnRef>
+            <a:fillRef idx="0">
+              <a:schemeClr val="accent1"/>
+            </a:fillRef>
+            <a:effectRef idx="0">
+              <a:schemeClr val="accent1"/>
+            </a:effectRef>
+            <a:fontRef idx="minor">
+              <a:schemeClr val="tx1"/>
+            </a:fontRef>
+          </p:style>
+        </p:cxnSp>
+        <p:cxnSp>
+          <p:nvCxnSpPr>
+            <p:cNvPr id="37" name="Lige pilforbindelse 36">
+              <a:extLst>
+                <a:ext uri="{FF2B5EF4-FFF2-40B4-BE49-F238E27FC236}">
+                  <a16:creationId xmlns:a16="http://schemas.microsoft.com/office/drawing/2014/main" id="{F863D326-F776-434E-B53B-6BE3AA846F88}"/>
+                </a:ext>
+              </a:extLst>
+            </p:cNvPr>
+            <p:cNvCxnSpPr>
+              <a:cxnSpLocks/>
+            </p:cNvCxnSpPr>
+            <p:nvPr/>
+          </p:nvCxnSpPr>
+          <p:spPr>
+            <a:xfrm>
+              <a:off x="6891338" y="2827534"/>
+              <a:ext cx="577723" cy="0"/>
+            </a:xfrm>
+            <a:prstGeom prst="straightConnector1">
+              <a:avLst/>
+            </a:prstGeom>
+            <a:ln w="25400" cap="rnd">
+              <a:solidFill>
+                <a:schemeClr val="tx1"/>
+              </a:solidFill>
+              <a:headEnd type="triangle"/>
+              <a:tailEnd type="none"/>
+            </a:ln>
+          </p:spPr>
+          <p:style>
+            <a:lnRef idx="1">
+              <a:schemeClr val="accent1"/>
+            </a:lnRef>
+            <a:fillRef idx="0">
+              <a:schemeClr val="accent1"/>
+            </a:fillRef>
+            <a:effectRef idx="0">
+              <a:schemeClr val="accent1"/>
+            </a:effectRef>
+            <a:fontRef idx="minor">
+              <a:schemeClr val="tx1"/>
+            </a:fontRef>
+          </p:style>
+        </p:cxnSp>
+        <p:cxnSp>
+          <p:nvCxnSpPr>
+            <p:cNvPr id="39" name="Lige pilforbindelse 38">
+              <a:extLst>
+                <a:ext uri="{FF2B5EF4-FFF2-40B4-BE49-F238E27FC236}">
+                  <a16:creationId xmlns:a16="http://schemas.microsoft.com/office/drawing/2014/main" id="{1455B1E8-85F4-4596-BA7F-C5DC6E32F920}"/>
+                </a:ext>
+              </a:extLst>
+            </p:cNvPr>
+            <p:cNvCxnSpPr>
+              <a:cxnSpLocks/>
+            </p:cNvCxnSpPr>
+            <p:nvPr/>
+          </p:nvCxnSpPr>
+          <p:spPr>
+            <a:xfrm>
+              <a:off x="6434140" y="3165668"/>
+              <a:ext cx="481013" cy="0"/>
+            </a:xfrm>
+            <a:prstGeom prst="straightConnector1">
+              <a:avLst/>
+            </a:prstGeom>
+            <a:ln w="25400" cap="rnd">
+              <a:solidFill>
+                <a:schemeClr val="tx1"/>
+              </a:solidFill>
+              <a:headEnd type="triangle"/>
+              <a:tailEnd type="none"/>
+            </a:ln>
+          </p:spPr>
+          <p:style>
+            <a:lnRef idx="1">
+              <a:schemeClr val="accent1"/>
+            </a:lnRef>
+            <a:fillRef idx="0">
+              <a:schemeClr val="accent1"/>
+            </a:fillRef>
+            <a:effectRef idx="0">
+              <a:schemeClr val="accent1"/>
+            </a:effectRef>
+            <a:fontRef idx="minor">
+              <a:schemeClr val="tx1"/>
+            </a:fontRef>
+          </p:style>
+        </p:cxnSp>
+      </p:grpSp>
+    </p:spTree>
+    <p:extLst>
+      <p:ext uri="{BB962C8B-B14F-4D97-AF65-F5344CB8AC3E}">
+        <p14:creationId xmlns:p14="http://schemas.microsoft.com/office/powerpoint/2010/main" val="2649588615"/>
+      </p:ext>
+    </p:extLst>
+  </p:cSld>
+  <p:clrMapOvr>
+    <a:masterClrMapping/>
+  </p:clrMapOvr>
+</p:sld>
+</file>
+
 <file path=ppt/theme/theme1.xml><?xml version="1.0" encoding="utf-8"?>
 <a:theme xmlns:a="http://schemas.openxmlformats.org/drawingml/2006/main" name="Office-tema">
   <a:themeElements>

</xml_diff>